<commit_message>
Include MD CodeSprint pre event chat
</commit_message>
<xml_diff>
--- a/SWG-Meetings/SWG24-10-24/SWG-24-10.pptx
+++ b/SWG-Meetings/SWG24-10-24/SWG-24-10.pptx
@@ -326,6 +326,11 @@
       </a:defRPr>
     </a:lvl9pPr>
   </p:defaultTextStyle>
+  <p:extLst>
+    <p:ext uri="{EFAFB233-063F-42B5-8137-9DF3F51BA10A}">
+      <p15:sldGuideLst xmlns:p15="http://schemas.microsoft.com/office/powerpoint/2012/main"/>
+    </p:ext>
+  </p:extLst>
 </p:presentation>
 </file>
 
@@ -3933,7 +3938,7 @@
           </a:ln>
           <a:extLst>
             <a:ext uri="{C572A759-6A51-4108-AA02-DFA0A04FC94B}">
-              <ma14:wrappingTextBoxFlag xmlns:ma14="http://schemas.microsoft.com/office/mac/drawingml/2011/main" xmlns:a14="http://schemas.microsoft.com/office/drawing/2010/main" xmlns:m="http://schemas.openxmlformats.org/officeDocument/2006/math" xmlns="" val="1"/>
+              <ma14:wrappingTextBoxFlag xmlns="" xmlns:m="http://schemas.openxmlformats.org/officeDocument/2006/math" xmlns:a14="http://schemas.microsoft.com/office/drawing/2010/main" xmlns:ma14="http://schemas.microsoft.com/office/mac/drawingml/2011/main" val="1"/>
             </a:ext>
           </a:extLst>
         </p:spPr>
@@ -3972,7 +3977,7 @@
           </a:ln>
           <a:extLst>
             <a:ext uri="{C572A759-6A51-4108-AA02-DFA0A04FC94B}">
-              <ma14:wrappingTextBoxFlag xmlns:ma14="http://schemas.microsoft.com/office/mac/drawingml/2011/main" xmlns:a14="http://schemas.microsoft.com/office/drawing/2010/main" xmlns:m="http://schemas.openxmlformats.org/officeDocument/2006/math" xmlns="" val="1"/>
+              <ma14:wrappingTextBoxFlag xmlns="" xmlns:m="http://schemas.openxmlformats.org/officeDocument/2006/math" xmlns:a14="http://schemas.microsoft.com/office/drawing/2010/main" xmlns:ma14="http://schemas.microsoft.com/office/mac/drawingml/2011/main" val="1"/>
             </a:ext>
           </a:extLst>
         </p:spPr>
@@ -4964,7 +4969,7 @@
           </a:prstGeom>
           <a:extLst>
             <a:ext uri="{C572A759-6A51-4108-AA02-DFA0A04FC94B}">
-              <ma14:wrappingTextBoxFlag xmlns:ma14="http://schemas.microsoft.com/office/mac/drawingml/2011/main" xmlns:a14="http://schemas.microsoft.com/office/drawing/2010/main" xmlns:m="http://schemas.openxmlformats.org/officeDocument/2006/math" xmlns="" val="1"/>
+              <ma14:wrappingTextBoxFlag xmlns="" xmlns:m="http://schemas.openxmlformats.org/officeDocument/2006/math" xmlns:a14="http://schemas.microsoft.com/office/drawing/2010/main" xmlns:ma14="http://schemas.microsoft.com/office/mac/drawingml/2011/main" val="1"/>
             </a:ext>
           </a:extLst>
         </p:spPr>
@@ -5180,7 +5185,7 @@
           </a:prstGeom>
           <a:extLst>
             <a:ext uri="{C572A759-6A51-4108-AA02-DFA0A04FC94B}">
-              <ma14:wrappingTextBoxFlag xmlns:ma14="http://schemas.microsoft.com/office/mac/drawingml/2011/main" xmlns:a14="http://schemas.microsoft.com/office/drawing/2010/main" xmlns:m="http://schemas.openxmlformats.org/officeDocument/2006/math" xmlns="" val="1"/>
+              <ma14:wrappingTextBoxFlag xmlns="" xmlns:m="http://schemas.openxmlformats.org/officeDocument/2006/math" xmlns:a14="http://schemas.microsoft.com/office/drawing/2010/main" xmlns:ma14="http://schemas.microsoft.com/office/mac/drawingml/2011/main" val="1"/>
             </a:ext>
           </a:extLst>
         </p:spPr>
@@ -5408,7 +5413,7 @@
           </a:prstGeom>
           <a:extLst>
             <a:ext uri="{C572A759-6A51-4108-AA02-DFA0A04FC94B}">
-              <ma14:wrappingTextBoxFlag xmlns:ma14="http://schemas.microsoft.com/office/mac/drawingml/2011/main" xmlns:a14="http://schemas.microsoft.com/office/drawing/2010/main" xmlns:m="http://schemas.openxmlformats.org/officeDocument/2006/math" xmlns="" val="1"/>
+              <ma14:wrappingTextBoxFlag xmlns="" xmlns:m="http://schemas.openxmlformats.org/officeDocument/2006/math" xmlns:a14="http://schemas.microsoft.com/office/drawing/2010/main" xmlns:ma14="http://schemas.microsoft.com/office/mac/drawingml/2011/main" val="1"/>
             </a:ext>
           </a:extLst>
         </p:spPr>
@@ -5476,7 +5481,14 @@
             </a:r>
             <a:r>
               <a:rPr dirty="0" err="1"/>
-              <a:t>chalenges</a:t>
+              <a:t>chal</a:t>
+            </a:r>
+            <a:r>
+              <a:rPr lang="mi-NZ"/>
+              <a:t>l</a:t>
+            </a:r>
+            <a:r>
+              <a:t>enges</a:t>
             </a:r>
             <a:r>
               <a:rPr dirty="0"/>
@@ -5566,7 +5578,7 @@
           </a:prstGeom>
           <a:extLst>
             <a:ext uri="{C572A759-6A51-4108-AA02-DFA0A04FC94B}">
-              <ma14:wrappingTextBoxFlag xmlns:ma14="http://schemas.microsoft.com/office/mac/drawingml/2011/main" xmlns:a14="http://schemas.microsoft.com/office/drawing/2010/main" xmlns:m="http://schemas.openxmlformats.org/officeDocument/2006/math" xmlns="" val="1"/>
+              <ma14:wrappingTextBoxFlag xmlns="" xmlns:m="http://schemas.openxmlformats.org/officeDocument/2006/math" xmlns:a14="http://schemas.microsoft.com/office/drawing/2010/main" xmlns:ma14="http://schemas.microsoft.com/office/mac/drawingml/2011/main" val="1"/>
             </a:ext>
           </a:extLst>
         </p:spPr>
@@ -5678,7 +5690,7 @@
           </a:prstGeom>
           <a:extLst>
             <a:ext uri="{C572A759-6A51-4108-AA02-DFA0A04FC94B}">
-              <ma14:wrappingTextBoxFlag xmlns:ma14="http://schemas.microsoft.com/office/mac/drawingml/2011/main" xmlns:a14="http://schemas.microsoft.com/office/drawing/2010/main" xmlns:m="http://schemas.openxmlformats.org/officeDocument/2006/math" xmlns="" val="1"/>
+              <ma14:wrappingTextBoxFlag xmlns="" xmlns:m="http://schemas.openxmlformats.org/officeDocument/2006/math" xmlns:a14="http://schemas.microsoft.com/office/drawing/2010/main" xmlns:ma14="http://schemas.microsoft.com/office/mac/drawingml/2011/main" val="1"/>
             </a:ext>
           </a:extLst>
         </p:spPr>
@@ -5912,7 +5924,7 @@
           </a:prstGeom>
           <a:extLst>
             <a:ext uri="{C572A759-6A51-4108-AA02-DFA0A04FC94B}">
-              <ma14:wrappingTextBoxFlag xmlns:ma14="http://schemas.microsoft.com/office/mac/drawingml/2011/main" xmlns:a14="http://schemas.microsoft.com/office/drawing/2010/main" xmlns:m="http://schemas.openxmlformats.org/officeDocument/2006/math" xmlns="" val="1"/>
+              <ma14:wrappingTextBoxFlag xmlns="" xmlns:m="http://schemas.openxmlformats.org/officeDocument/2006/math" xmlns:a14="http://schemas.microsoft.com/office/drawing/2010/main" xmlns:ma14="http://schemas.microsoft.com/office/mac/drawingml/2011/main" val="1"/>
             </a:ext>
           </a:extLst>
         </p:spPr>
@@ -6036,7 +6048,7 @@
           </a:prstGeom>
           <a:extLst>
             <a:ext uri="{C572A759-6A51-4108-AA02-DFA0A04FC94B}">
-              <ma14:wrappingTextBoxFlag xmlns:ma14="http://schemas.microsoft.com/office/mac/drawingml/2011/main" xmlns:a14="http://schemas.microsoft.com/office/drawing/2010/main" xmlns:m="http://schemas.openxmlformats.org/officeDocument/2006/math" xmlns="" val="1"/>
+              <ma14:wrappingTextBoxFlag xmlns="" xmlns:m="http://schemas.openxmlformats.org/officeDocument/2006/math" xmlns:a14="http://schemas.microsoft.com/office/drawing/2010/main" xmlns:ma14="http://schemas.microsoft.com/office/mac/drawingml/2011/main" val="1"/>
             </a:ext>
           </a:extLst>
         </p:spPr>
@@ -6140,7 +6152,7 @@
           </a:prstGeom>
           <a:extLst>
             <a:ext uri="{C572A759-6A51-4108-AA02-DFA0A04FC94B}">
-              <ma14:wrappingTextBoxFlag xmlns:ma14="http://schemas.microsoft.com/office/mac/drawingml/2011/main" xmlns:a14="http://schemas.microsoft.com/office/drawing/2010/main" xmlns:m="http://schemas.openxmlformats.org/officeDocument/2006/math" xmlns="" val="1"/>
+              <ma14:wrappingTextBoxFlag xmlns="" xmlns:m="http://schemas.openxmlformats.org/officeDocument/2006/math" xmlns:a14="http://schemas.microsoft.com/office/drawing/2010/main" xmlns:ma14="http://schemas.microsoft.com/office/mac/drawingml/2011/main" val="1"/>
             </a:ext>
           </a:extLst>
         </p:spPr>
@@ -6269,7 +6281,7 @@
           </a:prstGeom>
           <a:extLst>
             <a:ext uri="{C572A759-6A51-4108-AA02-DFA0A04FC94B}">
-              <ma14:wrappingTextBoxFlag xmlns:ma14="http://schemas.microsoft.com/office/mac/drawingml/2011/main" xmlns:a14="http://schemas.microsoft.com/office/drawing/2010/main" xmlns:m="http://schemas.openxmlformats.org/officeDocument/2006/math" xmlns="" val="1"/>
+              <ma14:wrappingTextBoxFlag xmlns="" xmlns:m="http://schemas.openxmlformats.org/officeDocument/2006/math" xmlns:a14="http://schemas.microsoft.com/office/drawing/2010/main" xmlns:ma14="http://schemas.microsoft.com/office/mac/drawingml/2011/main" val="1"/>
             </a:ext>
           </a:extLst>
         </p:spPr>
@@ -6483,7 +6495,7 @@
           </a:prstGeom>
           <a:extLst>
             <a:ext uri="{C572A759-6A51-4108-AA02-DFA0A04FC94B}">
-              <ma14:wrappingTextBoxFlag xmlns:ma14="http://schemas.microsoft.com/office/mac/drawingml/2011/main" xmlns:a14="http://schemas.microsoft.com/office/drawing/2010/main" xmlns:m="http://schemas.openxmlformats.org/officeDocument/2006/math" xmlns="" val="1"/>
+              <ma14:wrappingTextBoxFlag xmlns="" xmlns:m="http://schemas.openxmlformats.org/officeDocument/2006/math" xmlns:a14="http://schemas.microsoft.com/office/drawing/2010/main" xmlns:ma14="http://schemas.microsoft.com/office/mac/drawingml/2011/main" val="1"/>
             </a:ext>
           </a:extLst>
         </p:spPr>
@@ -6814,7 +6826,7 @@
           </a:prstGeom>
           <a:extLst>
             <a:ext uri="{C572A759-6A51-4108-AA02-DFA0A04FC94B}">
-              <ma14:wrappingTextBoxFlag xmlns:ma14="http://schemas.microsoft.com/office/mac/drawingml/2011/main" xmlns:a14="http://schemas.microsoft.com/office/drawing/2010/main" xmlns:m="http://schemas.openxmlformats.org/officeDocument/2006/math" xmlns="" val="1"/>
+              <ma14:wrappingTextBoxFlag xmlns="" xmlns:m="http://schemas.openxmlformats.org/officeDocument/2006/math" xmlns:a14="http://schemas.microsoft.com/office/drawing/2010/main" xmlns:ma14="http://schemas.microsoft.com/office/mac/drawingml/2011/main" val="1"/>
             </a:ext>
           </a:extLst>
         </p:spPr>
@@ -6946,7 +6958,7 @@
           </a:prstGeom>
           <a:extLst>
             <a:ext uri="{C572A759-6A51-4108-AA02-DFA0A04FC94B}">
-              <ma14:wrappingTextBoxFlag xmlns:ma14="http://schemas.microsoft.com/office/mac/drawingml/2011/main" xmlns:a14="http://schemas.microsoft.com/office/drawing/2010/main" xmlns:m="http://schemas.openxmlformats.org/officeDocument/2006/math" xmlns="" val="1"/>
+              <ma14:wrappingTextBoxFlag xmlns="" xmlns:m="http://schemas.openxmlformats.org/officeDocument/2006/math" xmlns:a14="http://schemas.microsoft.com/office/drawing/2010/main" xmlns:ma14="http://schemas.microsoft.com/office/mac/drawingml/2011/main" val="1"/>
             </a:ext>
           </a:extLst>
         </p:spPr>
@@ -7203,7 +7215,7 @@
           </a:prstGeom>
           <a:extLst>
             <a:ext uri="{C572A759-6A51-4108-AA02-DFA0A04FC94B}">
-              <ma14:wrappingTextBoxFlag xmlns:ma14="http://schemas.microsoft.com/office/mac/drawingml/2011/main" xmlns:a14="http://schemas.microsoft.com/office/drawing/2010/main" xmlns:m="http://schemas.openxmlformats.org/officeDocument/2006/math" xmlns="" val="1"/>
+              <ma14:wrappingTextBoxFlag xmlns="" xmlns:m="http://schemas.openxmlformats.org/officeDocument/2006/math" xmlns:a14="http://schemas.microsoft.com/office/drawing/2010/main" xmlns:ma14="http://schemas.microsoft.com/office/mac/drawingml/2011/main" val="1"/>
             </a:ext>
           </a:extLst>
         </p:spPr>
@@ -7357,7 +7369,7 @@
           </a:prstGeom>
           <a:extLst>
             <a:ext uri="{C572A759-6A51-4108-AA02-DFA0A04FC94B}">
-              <ma14:wrappingTextBoxFlag xmlns:ma14="http://schemas.microsoft.com/office/mac/drawingml/2011/main" xmlns:a14="http://schemas.microsoft.com/office/drawing/2010/main" xmlns:m="http://schemas.openxmlformats.org/officeDocument/2006/math" xmlns="" val="1"/>
+              <ma14:wrappingTextBoxFlag xmlns="" xmlns:m="http://schemas.openxmlformats.org/officeDocument/2006/math" xmlns:a14="http://schemas.microsoft.com/office/drawing/2010/main" xmlns:ma14="http://schemas.microsoft.com/office/mac/drawingml/2011/main" val="1"/>
             </a:ext>
           </a:extLst>
         </p:spPr>
@@ -11768,7 +11780,7 @@
           </a:prstGeom>
           <a:extLst>
             <a:ext uri="{C572A759-6A51-4108-AA02-DFA0A04FC94B}">
-              <ma14:wrappingTextBoxFlag xmlns:ma14="http://schemas.microsoft.com/office/mac/drawingml/2011/main" xmlns:a14="http://schemas.microsoft.com/office/drawing/2010/main" xmlns:m="http://schemas.openxmlformats.org/officeDocument/2006/math" xmlns="" val="1"/>
+              <ma14:wrappingTextBoxFlag xmlns="" xmlns:m="http://schemas.openxmlformats.org/officeDocument/2006/math" xmlns:a14="http://schemas.microsoft.com/office/drawing/2010/main" xmlns:ma14="http://schemas.microsoft.com/office/mac/drawingml/2011/main" val="1"/>
             </a:ext>
           </a:extLst>
         </p:spPr>
@@ -11951,7 +11963,7 @@
           </a:prstGeom>
           <a:extLst>
             <a:ext uri="{C572A759-6A51-4108-AA02-DFA0A04FC94B}">
-              <ma14:wrappingTextBoxFlag xmlns:ma14="http://schemas.microsoft.com/office/mac/drawingml/2011/main" xmlns:a14="http://schemas.microsoft.com/office/drawing/2010/main" xmlns:m="http://schemas.openxmlformats.org/officeDocument/2006/math" xmlns="" val="1"/>
+              <ma14:wrappingTextBoxFlag xmlns="" xmlns:m="http://schemas.openxmlformats.org/officeDocument/2006/math" xmlns:a14="http://schemas.microsoft.com/office/drawing/2010/main" xmlns:ma14="http://schemas.microsoft.com/office/mac/drawingml/2011/main" val="1"/>
             </a:ext>
           </a:extLst>
         </p:spPr>

</xml_diff>